<commit_message>
updating solution architecture diagram to include Compute Instance and also to fit what is deployed in the hands-on lab (AKS only)
</commit_message>
<xml_diff>
--- a/Media/Diagrams.pptx
+++ b/Media/Diagrams.pptx
@@ -261,7 +261,7 @@
           <a:p>
             <a:fld id="{B7E4EED9-D2B4-4FCD-A863-CDA8AF4DEF0D}" type="datetimeFigureOut">
               <a:rPr lang="en-US" smtClean="0"/>
-              <a:t>12/2/2019</a:t>
+              <a:t>3/27/20</a:t>
             </a:fld>
             <a:endParaRPr lang="en-US"/>
           </a:p>
@@ -459,7 +459,7 @@
           <a:p>
             <a:fld id="{B7E4EED9-D2B4-4FCD-A863-CDA8AF4DEF0D}" type="datetimeFigureOut">
               <a:rPr lang="en-US" smtClean="0"/>
-              <a:t>12/2/2019</a:t>
+              <a:t>3/27/20</a:t>
             </a:fld>
             <a:endParaRPr lang="en-US"/>
           </a:p>
@@ -667,7 +667,7 @@
           <a:p>
             <a:fld id="{B7E4EED9-D2B4-4FCD-A863-CDA8AF4DEF0D}" type="datetimeFigureOut">
               <a:rPr lang="en-US" smtClean="0"/>
-              <a:t>12/2/2019</a:t>
+              <a:t>3/27/20</a:t>
             </a:fld>
             <a:endParaRPr lang="en-US"/>
           </a:p>
@@ -865,7 +865,7 @@
           <a:p>
             <a:fld id="{B7E4EED9-D2B4-4FCD-A863-CDA8AF4DEF0D}" type="datetimeFigureOut">
               <a:rPr lang="en-US" smtClean="0"/>
-              <a:t>12/2/2019</a:t>
+              <a:t>3/27/20</a:t>
             </a:fld>
             <a:endParaRPr lang="en-US"/>
           </a:p>
@@ -1140,7 +1140,7 @@
           <a:p>
             <a:fld id="{B7E4EED9-D2B4-4FCD-A863-CDA8AF4DEF0D}" type="datetimeFigureOut">
               <a:rPr lang="en-US" smtClean="0"/>
-              <a:t>12/2/2019</a:t>
+              <a:t>3/27/20</a:t>
             </a:fld>
             <a:endParaRPr lang="en-US"/>
           </a:p>
@@ -1405,7 +1405,7 @@
           <a:p>
             <a:fld id="{B7E4EED9-D2B4-4FCD-A863-CDA8AF4DEF0D}" type="datetimeFigureOut">
               <a:rPr lang="en-US" smtClean="0"/>
-              <a:t>12/2/2019</a:t>
+              <a:t>3/27/20</a:t>
             </a:fld>
             <a:endParaRPr lang="en-US"/>
           </a:p>
@@ -1817,7 +1817,7 @@
           <a:p>
             <a:fld id="{B7E4EED9-D2B4-4FCD-A863-CDA8AF4DEF0D}" type="datetimeFigureOut">
               <a:rPr lang="en-US" smtClean="0"/>
-              <a:t>12/2/2019</a:t>
+              <a:t>3/27/20</a:t>
             </a:fld>
             <a:endParaRPr lang="en-US"/>
           </a:p>
@@ -1958,7 +1958,7 @@
           <a:p>
             <a:fld id="{B7E4EED9-D2B4-4FCD-A863-CDA8AF4DEF0D}" type="datetimeFigureOut">
               <a:rPr lang="en-US" smtClean="0"/>
-              <a:t>12/2/2019</a:t>
+              <a:t>3/27/20</a:t>
             </a:fld>
             <a:endParaRPr lang="en-US"/>
           </a:p>
@@ -2071,7 +2071,7 @@
           <a:p>
             <a:fld id="{B7E4EED9-D2B4-4FCD-A863-CDA8AF4DEF0D}" type="datetimeFigureOut">
               <a:rPr lang="en-US" smtClean="0"/>
-              <a:t>12/2/2019</a:t>
+              <a:t>3/27/20</a:t>
             </a:fld>
             <a:endParaRPr lang="en-US"/>
           </a:p>
@@ -2382,7 +2382,7 @@
           <a:p>
             <a:fld id="{B7E4EED9-D2B4-4FCD-A863-CDA8AF4DEF0D}" type="datetimeFigureOut">
               <a:rPr lang="en-US" smtClean="0"/>
-              <a:t>12/2/2019</a:t>
+              <a:t>3/27/20</a:t>
             </a:fld>
             <a:endParaRPr lang="en-US"/>
           </a:p>
@@ -2670,7 +2670,7 @@
           <a:p>
             <a:fld id="{B7E4EED9-D2B4-4FCD-A863-CDA8AF4DEF0D}" type="datetimeFigureOut">
               <a:rPr lang="en-US" smtClean="0"/>
-              <a:t>12/2/2019</a:t>
+              <a:t>3/27/20</a:t>
             </a:fld>
             <a:endParaRPr lang="en-US"/>
           </a:p>
@@ -2911,7 +2911,7 @@
           <a:p>
             <a:fld id="{B7E4EED9-D2B4-4FCD-A863-CDA8AF4DEF0D}" type="datetimeFigureOut">
               <a:rPr lang="en-US" smtClean="0"/>
-              <a:t>12/2/2019</a:t>
+              <a:t>3/27/20</a:t>
             </a:fld>
             <a:endParaRPr lang="en-US"/>
           </a:p>
@@ -8520,7 +8520,7 @@
         </p:nvGrpSpPr>
         <p:grpSpPr>
           <a:xfrm>
-            <a:off x="4091506" y="4234954"/>
+            <a:off x="5012704" y="4008041"/>
             <a:ext cx="1210785" cy="1384525"/>
             <a:chOff x="5269750" y="1438188"/>
             <a:chExt cx="1210785" cy="1384525"/>
@@ -8628,8 +8628,8 @@
             </p:blipFill>
             <p:spPr>
               <a:xfrm>
-                <a:off x="4703276" y="2975495"/>
-                <a:ext cx="442298" cy="476250"/>
+                <a:off x="4703277" y="2975495"/>
+                <a:ext cx="441323" cy="475200"/>
               </a:xfrm>
               <a:prstGeom prst="rect">
                 <a:avLst/>
@@ -8696,7 +8696,7 @@
         </p:nvSpPr>
         <p:spPr>
           <a:xfrm>
-            <a:off x="6012908" y="3781060"/>
+            <a:off x="6934106" y="3554147"/>
             <a:ext cx="977056" cy="461665"/>
           </a:xfrm>
           <a:prstGeom prst="rect">
@@ -8733,9 +8733,9 @@
         <p:grpSpPr>
           <a:xfrm>
             <a:off x="122697" y="120919"/>
-            <a:ext cx="1210785" cy="1386582"/>
+            <a:ext cx="1210785" cy="1384525"/>
             <a:chOff x="5269750" y="1438188"/>
-            <a:chExt cx="1210785" cy="1386582"/>
+            <a:chExt cx="1210785" cy="1384525"/>
           </a:xfrm>
         </p:grpSpPr>
         <p:sp>
@@ -8789,107 +8789,57 @@
             </a:p>
           </p:txBody>
         </p:sp>
-        <p:grpSp>
-          <p:nvGrpSpPr>
-            <p:cNvPr id="167" name="Group 166">
+        <p:sp>
+          <p:nvSpPr>
+            <p:cNvPr id="169" name="TextBox 168">
               <a:extLst>
                 <a:ext uri="{FF2B5EF4-FFF2-40B4-BE49-F238E27FC236}">
-                  <a16:creationId xmlns:a16="http://schemas.microsoft.com/office/drawing/2014/main" id="{DBFAA4BD-4A8E-45BF-886A-BFBB1B8CD2F9}"/>
+                  <a16:creationId xmlns:a16="http://schemas.microsoft.com/office/drawing/2014/main" id="{B829A4AA-2F99-4138-87C2-E1F1805A06D8}"/>
                 </a:ext>
               </a:extLst>
             </p:cNvPr>
-            <p:cNvGrpSpPr/>
+            <p:cNvSpPr txBox="1"/>
             <p:nvPr/>
-          </p:nvGrpSpPr>
-          <p:grpSpPr>
+          </p:nvSpPr>
+          <p:spPr>
             <a:xfrm>
-              <a:off x="5269750" y="1550249"/>
-              <a:ext cx="1210785" cy="1274521"/>
-              <a:chOff x="4319032" y="3033136"/>
-              <a:chExt cx="1210785" cy="1274521"/>
+              <a:off x="5269750" y="1993773"/>
+              <a:ext cx="1210785" cy="815608"/>
             </a:xfrm>
-          </p:grpSpPr>
-          <p:pic>
-            <p:nvPicPr>
-              <p:cNvPr id="168" name="Graphic 167">
-                <a:extLst>
-                  <a:ext uri="{FF2B5EF4-FFF2-40B4-BE49-F238E27FC236}">
-                    <a16:creationId xmlns:a16="http://schemas.microsoft.com/office/drawing/2014/main" id="{2781A7B2-05C6-4857-9571-F9AAEE0D1D1A}"/>
-                  </a:ext>
-                </a:extLst>
-              </p:cNvPr>
-              <p:cNvPicPr>
-                <a:picLocks noChangeAspect="1"/>
-              </p:cNvPicPr>
-              <p:nvPr/>
-            </p:nvPicPr>
-            <p:blipFill>
-              <a:blip r:embed="rId4">
-                <a:extLst>
-                  <a:ext uri="{28A0092B-C50C-407E-A947-70E740481C1C}">
-                    <a14:useLocalDpi xmlns:a14="http://schemas.microsoft.com/office/drawing/2010/main" val="0"/>
-                  </a:ext>
-                </a:extLst>
-              </a:blip>
-              <a:stretch>
-                <a:fillRect/>
-              </a:stretch>
-            </p:blipFill>
-            <p:spPr>
-              <a:xfrm>
-                <a:off x="4686300" y="3033136"/>
-                <a:ext cx="476250" cy="360967"/>
-              </a:xfrm>
-              <a:prstGeom prst="rect">
-                <a:avLst/>
-              </a:prstGeom>
-            </p:spPr>
-          </p:pic>
-          <p:sp>
-            <p:nvSpPr>
-              <p:cNvPr id="169" name="TextBox 168">
-                <a:extLst>
-                  <a:ext uri="{FF2B5EF4-FFF2-40B4-BE49-F238E27FC236}">
-                    <a16:creationId xmlns:a16="http://schemas.microsoft.com/office/drawing/2014/main" id="{B829A4AA-2F99-4138-87C2-E1F1805A06D8}"/>
-                  </a:ext>
-                </a:extLst>
-              </p:cNvPr>
-              <p:cNvSpPr txBox="1"/>
-              <p:nvPr/>
-            </p:nvSpPr>
-            <p:spPr>
-              <a:xfrm>
-                <a:off x="4319032" y="3476660"/>
-                <a:ext cx="1210785" cy="830997"/>
-              </a:xfrm>
-              <a:prstGeom prst="rect">
-                <a:avLst/>
-              </a:prstGeom>
-              <a:noFill/>
-            </p:spPr>
-            <p:txBody>
-              <a:bodyPr wrap="square" rtlCol="0">
-                <a:spAutoFit/>
-              </a:bodyPr>
-              <a:lstStyle/>
-              <a:p>
-                <a:pPr algn="ctr"/>
-                <a:r>
-                  <a:rPr lang="en-US" sz="1400" dirty="0"/>
-                  <a:t>Azure Notebooks</a:t>
-                </a:r>
-                <a:endParaRPr lang="en-US" sz="1100" dirty="0"/>
-              </a:p>
-              <a:p>
-                <a:pPr algn="ctr"/>
-                <a:r>
-                  <a:rPr lang="en-US" sz="1000" dirty="0"/>
-                  <a:t>ML Pipeline, Train, Eval Scripts</a:t>
-                </a:r>
-              </a:p>
-            </p:txBody>
-          </p:sp>
-        </p:grpSp>
+            <a:prstGeom prst="rect">
+              <a:avLst/>
+            </a:prstGeom>
+            <a:noFill/>
+          </p:spPr>
+          <p:txBody>
+            <a:bodyPr wrap="square" rtlCol="0">
+              <a:spAutoFit/>
+            </a:bodyPr>
+            <a:lstStyle/>
+            <a:p>
+              <a:pPr algn="ctr"/>
+              <a:r>
+                <a:rPr lang="en-US" sz="1200" dirty="0"/>
+                <a:t>AML Compute Instance </a:t>
+              </a:r>
+            </a:p>
+            <a:p>
+              <a:pPr algn="ctr"/>
+              <a:r>
+                <a:rPr lang="en-US" sz="500" dirty="0"/>
+                <a:t>(notebook experience)</a:t>
+              </a:r>
+              <a:endParaRPr lang="en-US" sz="1050" dirty="0"/>
+            </a:p>
+            <a:p>
+              <a:pPr algn="ctr"/>
+              <a:r>
+                <a:rPr lang="en-US" sz="900" dirty="0"/>
+                <a:t>ML Pipeline, Train, Eval Scripts</a:t>
+              </a:r>
+            </a:p>
+          </p:txBody>
+        </p:sp>
       </p:grpSp>
       <p:grpSp>
         <p:nvGrpSpPr>
@@ -8905,7 +8855,7 @@
         </p:nvGrpSpPr>
         <p:grpSpPr>
           <a:xfrm>
-            <a:off x="5579310" y="4239440"/>
+            <a:off x="6500508" y="4012527"/>
             <a:ext cx="1210785" cy="1386582"/>
             <a:chOff x="5269750" y="1438188"/>
             <a:chExt cx="1210785" cy="1386582"/>
@@ -8997,13 +8947,13 @@
               <p:nvPr/>
             </p:nvPicPr>
             <p:blipFill>
-              <a:blip r:embed="rId5">
+              <a:blip r:embed="rId4">
                 <a:extLst>
                   <a:ext uri="{28A0092B-C50C-407E-A947-70E740481C1C}">
                     <a14:useLocalDpi xmlns:a14="http://schemas.microsoft.com/office/drawing/2010/main" val="0"/>
                   </a:ext>
                   <a:ext uri="{96DAC541-7B7A-43D3-8B79-37D633B846F1}">
-                    <asvg:svgBlip xmlns:asvg="http://schemas.microsoft.com/office/drawing/2016/SVG/main" r:embed="rId6"/>
+                    <asvg:svgBlip xmlns:asvg="http://schemas.microsoft.com/office/drawing/2016/SVG/main" r:embed="rId5"/>
                   </a:ext>
                 </a:extLst>
               </a:blip>
@@ -9081,7 +9031,7 @@
         </p:nvSpPr>
         <p:spPr>
           <a:xfrm>
-            <a:off x="7878732" y="4703342"/>
+            <a:off x="8799930" y="4476429"/>
             <a:ext cx="1293684" cy="1880006"/>
           </a:xfrm>
           <a:prstGeom prst="roundRect">
@@ -9132,7 +9082,7 @@
         </p:nvGrpSpPr>
         <p:grpSpPr>
           <a:xfrm>
-            <a:off x="7920798" y="4666639"/>
+            <a:off x="8841996" y="4439726"/>
             <a:ext cx="1436572" cy="677108"/>
             <a:chOff x="4394751" y="2931613"/>
             <a:chExt cx="1436572" cy="677108"/>
@@ -9153,13 +9103,13 @@
             <p:nvPr/>
           </p:nvPicPr>
           <p:blipFill>
-            <a:blip r:embed="rId7">
+            <a:blip r:embed="rId6">
               <a:extLst>
                 <a:ext uri="{28A0092B-C50C-407E-A947-70E740481C1C}">
                   <a14:useLocalDpi xmlns:a14="http://schemas.microsoft.com/office/drawing/2010/main" val="0"/>
                 </a:ext>
                 <a:ext uri="{96DAC541-7B7A-43D3-8B79-37D633B846F1}">
-                  <asvg:svgBlip xmlns:asvg="http://schemas.microsoft.com/office/drawing/2016/SVG/main" r:embed="rId8"/>
+                  <asvg:svgBlip xmlns:asvg="http://schemas.microsoft.com/office/drawing/2016/SVG/main" r:embed="rId7"/>
                 </a:ext>
               </a:extLst>
             </a:blip>
@@ -9231,7 +9181,7 @@
         </p:nvGrpSpPr>
         <p:grpSpPr>
           <a:xfrm>
-            <a:off x="7915920" y="5198823"/>
+            <a:off x="8837118" y="4971910"/>
             <a:ext cx="1210785" cy="1386582"/>
             <a:chOff x="5269750" y="1438188"/>
             <a:chExt cx="1210785" cy="1386582"/>
@@ -9410,7 +9360,7 @@
         </p:nvGrpSpPr>
         <p:grpSpPr>
           <a:xfrm>
-            <a:off x="940889" y="1575606"/>
+            <a:off x="1862087" y="1348693"/>
             <a:ext cx="1210785" cy="1386582"/>
             <a:chOff x="5269750" y="1438188"/>
             <a:chExt cx="1210785" cy="1386582"/>
@@ -9502,13 +9452,13 @@
               <p:nvPr/>
             </p:nvPicPr>
             <p:blipFill>
-              <a:blip r:embed="rId9">
+              <a:blip r:embed="rId8">
                 <a:extLst>
                   <a:ext uri="{28A0092B-C50C-407E-A947-70E740481C1C}">
                     <a14:useLocalDpi xmlns:a14="http://schemas.microsoft.com/office/drawing/2010/main" val="0"/>
                   </a:ext>
                   <a:ext uri="{96DAC541-7B7A-43D3-8B79-37D633B846F1}">
-                    <asvg:svgBlip xmlns:asvg="http://schemas.microsoft.com/office/drawing/2016/SVG/main" r:embed="rId10"/>
+                    <asvg:svgBlip xmlns:asvg="http://schemas.microsoft.com/office/drawing/2016/SVG/main" r:embed="rId9"/>
                   </a:ext>
                 </a:extLst>
               </a:blip>
@@ -9586,7 +9536,7 @@
         </p:nvGrpSpPr>
         <p:grpSpPr>
           <a:xfrm>
-            <a:off x="412284" y="4345826"/>
+            <a:off x="1333482" y="4118913"/>
             <a:ext cx="3255759" cy="2291084"/>
             <a:chOff x="3230386" y="4566916"/>
             <a:chExt cx="3255759" cy="2291084"/>
@@ -9758,7 +9708,7 @@
                 <p:nvPr/>
               </p:nvPicPr>
               <p:blipFill>
-                <a:blip r:embed="rId11">
+                <a:blip r:embed="rId10">
                   <a:extLst>
                     <a:ext uri="{28A0092B-C50C-407E-A947-70E740481C1C}">
                       <a14:useLocalDpi xmlns:a14="http://schemas.microsoft.com/office/drawing/2010/main" val="0"/>
@@ -9931,7 +9881,7 @@
                 <p:nvPr/>
               </p:nvPicPr>
               <p:blipFill>
-                <a:blip r:embed="rId12">
+                <a:blip r:embed="rId11">
                   <a:extLst>
                     <a:ext uri="{28A0092B-C50C-407E-A947-70E740481C1C}">
                       <a14:useLocalDpi xmlns:a14="http://schemas.microsoft.com/office/drawing/2010/main" val="0"/>
@@ -10051,7 +10001,7 @@
         </p:nvCxnSpPr>
         <p:spPr>
           <a:xfrm rot="10800000" flipV="1">
-            <a:off x="3705232" y="6169906"/>
+            <a:off x="4626430" y="5942993"/>
             <a:ext cx="4210689" cy="322667"/>
           </a:xfrm>
           <a:prstGeom prst="bentConnector3">
@@ -10092,7 +10042,7 @@
         </p:nvSpPr>
         <p:spPr>
           <a:xfrm>
-            <a:off x="3784607" y="6057921"/>
+            <a:off x="4705805" y="5831008"/>
             <a:ext cx="2296696" cy="461665"/>
           </a:xfrm>
           <a:prstGeom prst="rect">
@@ -10115,10 +10065,10 @@
       </p:sp>
       <p:sp>
         <p:nvSpPr>
-          <p:cNvPr id="102" name="TextBox 101">
-            <a:extLst>
-              <a:ext uri="{FF2B5EF4-FFF2-40B4-BE49-F238E27FC236}">
-                <a16:creationId xmlns:a16="http://schemas.microsoft.com/office/drawing/2014/main" id="{B90BCEDB-E089-417C-83B1-80C2227C72F2}"/>
+          <p:cNvPr id="109" name="TextBox 108">
+            <a:extLst>
+              <a:ext uri="{FF2B5EF4-FFF2-40B4-BE49-F238E27FC236}">
+                <a16:creationId xmlns:a16="http://schemas.microsoft.com/office/drawing/2014/main" id="{368D1072-DE87-49E3-AF65-36A38AA943B0}"/>
               </a:ext>
             </a:extLst>
           </p:cNvPr>
@@ -10127,8 +10077,8 @@
         </p:nvSpPr>
         <p:spPr>
           <a:xfrm>
-            <a:off x="-530172" y="1563847"/>
-            <a:ext cx="1318590" cy="461665"/>
+            <a:off x="2692124" y="2942413"/>
+            <a:ext cx="833844" cy="830997"/>
           </a:xfrm>
           <a:prstGeom prst="rect">
             <a:avLst/>
@@ -10141,49 +10091,6 @@
           </a:bodyPr>
           <a:lstStyle/>
           <a:p>
-            <a:pPr algn="r"/>
-            <a:r>
-              <a:rPr lang="en-US" sz="1200" dirty="0"/>
-              <a:t>Change</a:t>
-            </a:r>
-            <a:br>
-              <a:rPr lang="en-US" sz="1200" dirty="0"/>
-            </a:br>
-            <a:r>
-              <a:rPr lang="en-US" sz="1200" dirty="0"/>
-              <a:t>script</a:t>
-            </a:r>
-          </a:p>
-        </p:txBody>
-      </p:sp>
-      <p:sp>
-        <p:nvSpPr>
-          <p:cNvPr id="109" name="TextBox 108">
-            <a:extLst>
-              <a:ext uri="{FF2B5EF4-FFF2-40B4-BE49-F238E27FC236}">
-                <a16:creationId xmlns:a16="http://schemas.microsoft.com/office/drawing/2014/main" id="{368D1072-DE87-49E3-AF65-36A38AA943B0}"/>
-              </a:ext>
-            </a:extLst>
-          </p:cNvPr>
-          <p:cNvSpPr txBox="1"/>
-          <p:nvPr/>
-        </p:nvSpPr>
-        <p:spPr>
-          <a:xfrm>
-            <a:off x="1770926" y="3169326"/>
-            <a:ext cx="833844" cy="830997"/>
-          </a:xfrm>
-          <a:prstGeom prst="rect">
-            <a:avLst/>
-          </a:prstGeom>
-          <a:noFill/>
-        </p:spPr>
-        <p:txBody>
-          <a:bodyPr wrap="square" rtlCol="0">
-            <a:spAutoFit/>
-          </a:bodyPr>
-          <a:lstStyle/>
-          <a:p>
             <a:r>
               <a:rPr lang="en-US" sz="1200" dirty="0"/>
               <a:t>Trigger DevOps</a:t>
@@ -10211,7 +10118,7 @@
         </p:nvSpPr>
         <p:spPr>
           <a:xfrm>
-            <a:off x="2492636" y="901360"/>
+            <a:off x="3413834" y="674447"/>
             <a:ext cx="3588667" cy="2616350"/>
           </a:xfrm>
           <a:prstGeom prst="roundRect">
@@ -10262,7 +10169,7 @@
         </p:nvGrpSpPr>
         <p:grpSpPr>
           <a:xfrm>
-            <a:off x="2616421" y="949361"/>
+            <a:off x="3537619" y="722448"/>
             <a:ext cx="1886650" cy="394606"/>
             <a:chOff x="4488581" y="3016317"/>
             <a:chExt cx="1886650" cy="394606"/>
@@ -10283,13 +10190,13 @@
             <p:nvPr/>
           </p:nvPicPr>
           <p:blipFill>
-            <a:blip r:embed="rId9">
+            <a:blip r:embed="rId8">
               <a:extLst>
                 <a:ext uri="{28A0092B-C50C-407E-A947-70E740481C1C}">
                   <a14:useLocalDpi xmlns:a14="http://schemas.microsoft.com/office/drawing/2010/main" val="0"/>
                 </a:ext>
                 <a:ext uri="{96DAC541-7B7A-43D3-8B79-37D633B846F1}">
-                  <asvg:svgBlip xmlns:asvg="http://schemas.microsoft.com/office/drawing/2016/SVG/main" r:embed="rId10"/>
+                  <asvg:svgBlip xmlns:asvg="http://schemas.microsoft.com/office/drawing/2016/SVG/main" r:embed="rId9"/>
                 </a:ext>
               </a:extLst>
             </a:blip>
@@ -10358,7 +10265,7 @@
         </p:nvSpPr>
         <p:spPr>
           <a:xfrm>
-            <a:off x="2518042" y="1237285"/>
+            <a:off x="3439240" y="1010372"/>
             <a:ext cx="3555173" cy="461665"/>
           </a:xfrm>
           <a:prstGeom prst="rect">
@@ -10414,7 +10321,7 @@
         </p:nvSpPr>
         <p:spPr bwMode="auto">
           <a:xfrm>
-            <a:off x="2628570" y="1714984"/>
+            <a:off x="3549768" y="1488071"/>
             <a:ext cx="3250636" cy="934456"/>
           </a:xfrm>
           <a:prstGeom prst="roundRect">
@@ -10496,7 +10403,7 @@
         </p:nvGrpSpPr>
         <p:grpSpPr>
           <a:xfrm>
-            <a:off x="2415010" y="1811416"/>
+            <a:off x="3336208" y="1584503"/>
             <a:ext cx="1150863" cy="1354498"/>
             <a:chOff x="1955837" y="4721441"/>
             <a:chExt cx="1150863" cy="1354498"/>
@@ -10661,7 +10568,7 @@
         </p:nvCxnSpPr>
         <p:spPr>
           <a:xfrm>
-            <a:off x="3089998" y="2192328"/>
+            <a:off x="4011196" y="1965415"/>
             <a:ext cx="2075187" cy="0"/>
           </a:xfrm>
           <a:prstGeom prst="straightConnector1">
@@ -10700,7 +10607,7 @@
         </p:nvGrpSpPr>
         <p:grpSpPr>
           <a:xfrm>
-            <a:off x="3172681" y="1811416"/>
+            <a:off x="4093879" y="1584503"/>
             <a:ext cx="1150863" cy="1549972"/>
             <a:chOff x="3256846" y="4721441"/>
             <a:chExt cx="1150863" cy="1549972"/>
@@ -10869,7 +10776,7 @@
         </p:nvGrpSpPr>
         <p:grpSpPr>
           <a:xfrm>
-            <a:off x="3980678" y="1814958"/>
+            <a:off x="4901876" y="1588045"/>
             <a:ext cx="1150863" cy="1552981"/>
             <a:chOff x="4290132" y="4724983"/>
             <a:chExt cx="1150863" cy="1552981"/>
@@ -11038,7 +10945,7 @@
         </p:nvGrpSpPr>
         <p:grpSpPr>
           <a:xfrm>
-            <a:off x="4888423" y="1811416"/>
+            <a:off x="5809621" y="1584503"/>
             <a:ext cx="1150863" cy="1749102"/>
             <a:chOff x="5303894" y="4721441"/>
             <a:chExt cx="1150863" cy="1749102"/>
@@ -11200,7 +11107,7 @@
         </p:nvSpPr>
         <p:spPr>
           <a:xfrm>
-            <a:off x="6169754" y="2456982"/>
+            <a:off x="7090952" y="2230069"/>
             <a:ext cx="833844" cy="830997"/>
           </a:xfrm>
           <a:prstGeom prst="rect">
@@ -11250,7 +11157,7 @@
         </p:nvCxnSpPr>
         <p:spPr>
           <a:xfrm>
-            <a:off x="6073215" y="2320751"/>
+            <a:off x="6994413" y="2093838"/>
             <a:ext cx="852036" cy="0"/>
           </a:xfrm>
           <a:prstGeom prst="straightConnector1">
@@ -11289,7 +11196,7 @@
         </p:nvSpPr>
         <p:spPr>
           <a:xfrm>
-            <a:off x="6047083" y="1760493"/>
+            <a:off x="6968281" y="1533580"/>
             <a:ext cx="833844" cy="461665"/>
           </a:xfrm>
           <a:prstGeom prst="rect">
@@ -11325,7 +11232,7 @@
         </p:nvSpPr>
         <p:spPr>
           <a:xfrm>
-            <a:off x="6947031" y="939732"/>
+            <a:off x="7868229" y="712819"/>
             <a:ext cx="2398072" cy="2616350"/>
           </a:xfrm>
           <a:prstGeom prst="roundRect">
@@ -11376,7 +11283,7 @@
         </p:nvGrpSpPr>
         <p:grpSpPr>
           <a:xfrm>
-            <a:off x="7258775" y="987733"/>
+            <a:off x="8179973" y="760820"/>
             <a:ext cx="1886650" cy="394606"/>
             <a:chOff x="4488581" y="3016317"/>
             <a:chExt cx="1886650" cy="394606"/>
@@ -11397,13 +11304,13 @@
             <p:nvPr/>
           </p:nvPicPr>
           <p:blipFill>
-            <a:blip r:embed="rId9">
+            <a:blip r:embed="rId8">
               <a:extLst>
                 <a:ext uri="{28A0092B-C50C-407E-A947-70E740481C1C}">
                   <a14:useLocalDpi xmlns:a14="http://schemas.microsoft.com/office/drawing/2010/main" val="0"/>
                 </a:ext>
                 <a:ext uri="{96DAC541-7B7A-43D3-8B79-37D633B846F1}">
-                  <asvg:svgBlip xmlns:asvg="http://schemas.microsoft.com/office/drawing/2016/SVG/main" r:embed="rId10"/>
+                  <asvg:svgBlip xmlns:asvg="http://schemas.microsoft.com/office/drawing/2016/SVG/main" r:embed="rId9"/>
                 </a:ext>
               </a:extLst>
             </a:blip>
@@ -11472,7 +11379,7 @@
         </p:nvSpPr>
         <p:spPr bwMode="auto">
           <a:xfrm>
-            <a:off x="7024009" y="1753356"/>
+            <a:off x="7945207" y="1526443"/>
             <a:ext cx="2220409" cy="934456"/>
           </a:xfrm>
           <a:prstGeom prst="roundRect">
@@ -11557,7 +11464,7 @@
         </p:nvCxnSpPr>
         <p:spPr>
           <a:xfrm>
-            <a:off x="7737264" y="2230700"/>
+            <a:off x="8658462" y="2003787"/>
             <a:ext cx="819030" cy="0"/>
           </a:xfrm>
           <a:prstGeom prst="straightConnector1">
@@ -11596,7 +11503,7 @@
         </p:nvGrpSpPr>
         <p:grpSpPr>
           <a:xfrm>
-            <a:off x="7596183" y="1849788"/>
+            <a:off x="8517381" y="1622875"/>
             <a:ext cx="1150863" cy="1354498"/>
             <a:chOff x="2116019" y="4721441"/>
             <a:chExt cx="1150863" cy="1354498"/>
@@ -11758,7 +11665,7 @@
         </p:nvGrpSpPr>
         <p:grpSpPr>
           <a:xfrm>
-            <a:off x="8279532" y="1849788"/>
+            <a:off x="9200730" y="1622875"/>
             <a:ext cx="1150863" cy="1549972"/>
             <a:chOff x="3377050" y="4721441"/>
             <a:chExt cx="1150863" cy="1549972"/>
@@ -11927,7 +11834,7 @@
         </p:nvSpPr>
         <p:spPr>
           <a:xfrm>
-            <a:off x="7129563" y="1303045"/>
+            <a:off x="8050761" y="1076132"/>
             <a:ext cx="2196502" cy="461665"/>
           </a:xfrm>
           <a:prstGeom prst="rect">
@@ -11971,49 +11878,6 @@
       </p:sp>
       <p:cxnSp>
         <p:nvCxnSpPr>
-          <p:cNvPr id="13" name="Connector: Elbow 12">
-            <a:extLst>
-              <a:ext uri="{FF2B5EF4-FFF2-40B4-BE49-F238E27FC236}">
-                <a16:creationId xmlns:a16="http://schemas.microsoft.com/office/drawing/2014/main" id="{4987ED31-CB18-4133-A042-7D7287EF3311}"/>
-              </a:ext>
-            </a:extLst>
-          </p:cNvPr>
-          <p:cNvCxnSpPr>
-            <a:cxnSpLocks/>
-            <a:stCxn id="166" idx="2"/>
-            <a:endCxn id="279" idx="1"/>
-          </p:cNvCxnSpPr>
-          <p:nvPr/>
-        </p:nvCxnSpPr>
-        <p:spPr>
-          <a:xfrm rot="16200000" flipH="1">
-            <a:off x="313866" y="1919667"/>
-            <a:ext cx="1041246" cy="212799"/>
-          </a:xfrm>
-          <a:prstGeom prst="bentConnector2">
-            <a:avLst/>
-          </a:prstGeom>
-          <a:ln>
-            <a:tailEnd type="triangle"/>
-          </a:ln>
-        </p:spPr>
-        <p:style>
-          <a:lnRef idx="1">
-            <a:schemeClr val="accent1"/>
-          </a:lnRef>
-          <a:fillRef idx="0">
-            <a:schemeClr val="accent1"/>
-          </a:fillRef>
-          <a:effectRef idx="0">
-            <a:schemeClr val="accent1"/>
-          </a:effectRef>
-          <a:fontRef idx="minor">
-            <a:schemeClr val="tx1"/>
-          </a:fontRef>
-        </p:style>
-      </p:cxnSp>
-      <p:cxnSp>
-        <p:nvCxnSpPr>
           <p:cNvPr id="22" name="Connector: Elbow 21">
             <a:extLst>
               <a:ext uri="{FF2B5EF4-FFF2-40B4-BE49-F238E27FC236}">
@@ -12030,7 +11894,7 @@
         </p:nvCxnSpPr>
         <p:spPr>
           <a:xfrm rot="5400000" flipH="1" flipV="1">
-            <a:off x="1643132" y="2112685"/>
+            <a:off x="2564330" y="1885772"/>
             <a:ext cx="752653" cy="946354"/>
           </a:xfrm>
           <a:prstGeom prst="bentConnector4">
@@ -12072,7 +11936,7 @@
         </p:nvSpPr>
         <p:spPr>
           <a:xfrm>
-            <a:off x="6834588" y="2742621"/>
+            <a:off x="7755786" y="2515708"/>
             <a:ext cx="1150863" cy="646331"/>
           </a:xfrm>
           <a:prstGeom prst="rect">
@@ -12123,7 +11987,7 @@
         </p:nvSpPr>
         <p:spPr bwMode="auto">
           <a:xfrm>
-            <a:off x="7139925" y="1849788"/>
+            <a:off x="8061123" y="1622875"/>
             <a:ext cx="597339" cy="761824"/>
           </a:xfrm>
           <a:prstGeom prst="flowChartMagneticDrum">
@@ -12223,7 +12087,7 @@
         </p:nvCxnSpPr>
         <p:spPr>
           <a:xfrm rot="5400000">
-            <a:off x="4743159" y="3514258"/>
+            <a:off x="5664357" y="3287345"/>
             <a:ext cx="674436" cy="766956"/>
           </a:xfrm>
           <a:prstGeom prst="bentConnector3">
@@ -12266,7 +12130,7 @@
         </p:nvCxnSpPr>
         <p:spPr>
           <a:xfrm rot="16200000" flipH="1">
-            <a:off x="5484818" y="3539555"/>
+            <a:off x="6406016" y="3312642"/>
             <a:ext cx="678922" cy="720848"/>
           </a:xfrm>
           <a:prstGeom prst="bentConnector3">
@@ -12305,7 +12169,7 @@
         </p:nvSpPr>
         <p:spPr bwMode="auto">
           <a:xfrm>
-            <a:off x="6336686" y="2199101"/>
+            <a:off x="7257884" y="1972188"/>
             <a:ext cx="288858" cy="239737"/>
           </a:xfrm>
           <a:prstGeom prst="cube">
@@ -12388,7 +12252,7 @@
         </p:nvCxnSpPr>
         <p:spPr>
           <a:xfrm rot="5400000">
-            <a:off x="8005431" y="3861200"/>
+            <a:off x="8926629" y="3634287"/>
             <a:ext cx="1314174" cy="384466"/>
           </a:xfrm>
           <a:prstGeom prst="bentConnector3">
@@ -12430,7 +12294,7 @@
         </p:nvCxnSpPr>
         <p:spPr>
           <a:xfrm>
-            <a:off x="6790095" y="4878862"/>
+            <a:off x="7711293" y="4651949"/>
             <a:ext cx="1088637" cy="764483"/>
           </a:xfrm>
           <a:prstGeom prst="bentConnector3">
@@ -12472,7 +12336,7 @@
         </p:nvSpPr>
         <p:spPr>
           <a:xfrm>
-            <a:off x="3900646" y="3750572"/>
+            <a:off x="4821844" y="3523659"/>
             <a:ext cx="977056" cy="461665"/>
           </a:xfrm>
           <a:prstGeom prst="rect">
@@ -12494,6 +12358,45 @@
           </a:p>
         </p:txBody>
       </p:sp>
+      <p:pic>
+        <p:nvPicPr>
+          <p:cNvPr id="94" name="Graphic 93">
+            <a:extLst>
+              <a:ext uri="{FF2B5EF4-FFF2-40B4-BE49-F238E27FC236}">
+                <a16:creationId xmlns:a16="http://schemas.microsoft.com/office/drawing/2014/main" id="{44A51EF5-F666-4F4D-8E76-7DAEA623C3CD}"/>
+              </a:ext>
+            </a:extLst>
+          </p:cNvPr>
+          <p:cNvPicPr>
+            <a:picLocks noChangeAspect="1"/>
+          </p:cNvPicPr>
+          <p:nvPr/>
+        </p:nvPicPr>
+        <p:blipFill>
+          <a:blip r:embed="rId2">
+            <a:extLst>
+              <a:ext uri="{28A0092B-C50C-407E-A947-70E740481C1C}">
+                <a14:useLocalDpi xmlns:a14="http://schemas.microsoft.com/office/drawing/2010/main" val="0"/>
+              </a:ext>
+              <a:ext uri="{96DAC541-7B7A-43D3-8B79-37D633B846F1}">
+                <asvg:svgBlip xmlns:asvg="http://schemas.microsoft.com/office/drawing/2016/SVG/main" r:embed="rId3"/>
+              </a:ext>
+            </a:extLst>
+          </a:blip>
+          <a:stretch>
+            <a:fillRect/>
+          </a:stretch>
+        </p:blipFill>
+        <p:spPr>
+          <a:xfrm>
+            <a:off x="527273" y="199247"/>
+            <a:ext cx="441323" cy="475200"/>
+          </a:xfrm>
+          <a:prstGeom prst="rect">
+            <a:avLst/>
+          </a:prstGeom>
+        </p:spPr>
+      </p:pic>
     </p:spTree>
     <p:extLst>
       <p:ext uri="{BB962C8B-B14F-4D97-AF65-F5344CB8AC3E}">

</xml_diff>